<commit_message>
pptx of checkpoint finished
</commit_message>
<xml_diff>
--- a/docs/checkpoint.pptx
+++ b/docs/checkpoint.pptx
@@ -108,7 +108,41 @@
       </a:defRPr>
     </a:lvl9pPr>
   </p:defaultTextStyle>
+  <p:extLst>
+    <p:ext uri="{EFAFB233-063F-42B5-8137-9DF3F51BA10A}">
+      <p15:sldGuideLst xmlns:p15="http://schemas.microsoft.com/office/powerpoint/2012/main"/>
+    </p:ext>
+  </p:extLst>
 </p:presentation>
+</file>
+
+<file path=ppt/changesInfos/changesInfo1.xml><?xml version="1.0" encoding="utf-8"?>
+<pc:chgInfo xmlns:a="http://schemas.openxmlformats.org/drawingml/2006/main" xmlns:r="http://schemas.openxmlformats.org/officeDocument/2006/relationships" xmlns:ac="http://schemas.microsoft.com/office/drawing/2013/main/command" xmlns:pc="http://schemas.microsoft.com/office/powerpoint/2013/main/command">
+  <pc:docChgLst>
+    <pc:chgData name="André Costa" userId="19fc697903e1aad7" providerId="LiveId" clId="{F9384AFB-4292-4E89-B21C-57023ED737FD}"/>
+    <pc:docChg chg="modSld">
+      <pc:chgData name="André Costa" userId="19fc697903e1aad7" providerId="LiveId" clId="{F9384AFB-4292-4E89-B21C-57023ED737FD}" dt="2023-05-02T19:37:03.056" v="73" actId="20577"/>
+      <pc:docMkLst>
+        <pc:docMk/>
+      </pc:docMkLst>
+      <pc:sldChg chg="modSp mod">
+        <pc:chgData name="André Costa" userId="19fc697903e1aad7" providerId="LiveId" clId="{F9384AFB-4292-4E89-B21C-57023ED737FD}" dt="2023-05-02T19:37:03.056" v="73" actId="20577"/>
+        <pc:sldMkLst>
+          <pc:docMk/>
+          <pc:sldMk cId="2068101650" sldId="260"/>
+        </pc:sldMkLst>
+        <pc:spChg chg="mod">
+          <ac:chgData name="André Costa" userId="19fc697903e1aad7" providerId="LiveId" clId="{F9384AFB-4292-4E89-B21C-57023ED737FD}" dt="2023-05-02T19:37:03.056" v="73" actId="20577"/>
+          <ac:spMkLst>
+            <pc:docMk/>
+            <pc:sldMk cId="2068101650" sldId="260"/>
+            <ac:spMk id="3" creationId="{C9FF7FA9-CD0D-E0F8-F302-B0E747AF24A9}"/>
+          </ac:spMkLst>
+        </pc:spChg>
+      </pc:sldChg>
+    </pc:docChg>
+  </pc:docChgLst>
+</pc:chgInfo>
 </file>
 
 <file path=ppt/slideLayouts/slideLayout1.xml><?xml version="1.0" encoding="utf-8"?>
@@ -258,7 +292,7 @@
           <a:p>
             <a:fld id="{6B0EF491-B434-477E-862B-117F5FDA35FB}" type="datetimeFigureOut">
               <a:rPr lang="en-US" smtClean="0"/>
-              <a:t>4/29/2023</a:t>
+              <a:t>5/2/2023</a:t>
             </a:fld>
             <a:endParaRPr lang="en-US"/>
           </a:p>
@@ -456,7 +490,7 @@
           <a:p>
             <a:fld id="{6B0EF491-B434-477E-862B-117F5FDA35FB}" type="datetimeFigureOut">
               <a:rPr lang="en-US" smtClean="0"/>
-              <a:t>4/29/2023</a:t>
+              <a:t>5/2/2023</a:t>
             </a:fld>
             <a:endParaRPr lang="en-US"/>
           </a:p>
@@ -664,7 +698,7 @@
           <a:p>
             <a:fld id="{6B0EF491-B434-477E-862B-117F5FDA35FB}" type="datetimeFigureOut">
               <a:rPr lang="en-US" smtClean="0"/>
-              <a:t>4/29/2023</a:t>
+              <a:t>5/2/2023</a:t>
             </a:fld>
             <a:endParaRPr lang="en-US"/>
           </a:p>
@@ -862,7 +896,7 @@
           <a:p>
             <a:fld id="{6B0EF491-B434-477E-862B-117F5FDA35FB}" type="datetimeFigureOut">
               <a:rPr lang="en-US" smtClean="0"/>
-              <a:t>4/29/2023</a:t>
+              <a:t>5/2/2023</a:t>
             </a:fld>
             <a:endParaRPr lang="en-US"/>
           </a:p>
@@ -1137,7 +1171,7 @@
           <a:p>
             <a:fld id="{6B0EF491-B434-477E-862B-117F5FDA35FB}" type="datetimeFigureOut">
               <a:rPr lang="en-US" smtClean="0"/>
-              <a:t>4/29/2023</a:t>
+              <a:t>5/2/2023</a:t>
             </a:fld>
             <a:endParaRPr lang="en-US"/>
           </a:p>
@@ -1402,7 +1436,7 @@
           <a:p>
             <a:fld id="{6B0EF491-B434-477E-862B-117F5FDA35FB}" type="datetimeFigureOut">
               <a:rPr lang="en-US" smtClean="0"/>
-              <a:t>4/29/2023</a:t>
+              <a:t>5/2/2023</a:t>
             </a:fld>
             <a:endParaRPr lang="en-US"/>
           </a:p>
@@ -1814,7 +1848,7 @@
           <a:p>
             <a:fld id="{6B0EF491-B434-477E-862B-117F5FDA35FB}" type="datetimeFigureOut">
               <a:rPr lang="en-US" smtClean="0"/>
-              <a:t>4/29/2023</a:t>
+              <a:t>5/2/2023</a:t>
             </a:fld>
             <a:endParaRPr lang="en-US"/>
           </a:p>
@@ -1955,7 +1989,7 @@
           <a:p>
             <a:fld id="{6B0EF491-B434-477E-862B-117F5FDA35FB}" type="datetimeFigureOut">
               <a:rPr lang="en-US" smtClean="0"/>
-              <a:t>4/29/2023</a:t>
+              <a:t>5/2/2023</a:t>
             </a:fld>
             <a:endParaRPr lang="en-US"/>
           </a:p>
@@ -2068,7 +2102,7 @@
           <a:p>
             <a:fld id="{6B0EF491-B434-477E-862B-117F5FDA35FB}" type="datetimeFigureOut">
               <a:rPr lang="en-US" smtClean="0"/>
-              <a:t>4/29/2023</a:t>
+              <a:t>5/2/2023</a:t>
             </a:fld>
             <a:endParaRPr lang="en-US"/>
           </a:p>
@@ -2379,7 +2413,7 @@
           <a:p>
             <a:fld id="{6B0EF491-B434-477E-862B-117F5FDA35FB}" type="datetimeFigureOut">
               <a:rPr lang="en-US" smtClean="0"/>
-              <a:t>4/29/2023</a:t>
+              <a:t>5/2/2023</a:t>
             </a:fld>
             <a:endParaRPr lang="en-US"/>
           </a:p>
@@ -2667,7 +2701,7 @@
           <a:p>
             <a:fld id="{6B0EF491-B434-477E-862B-117F5FDA35FB}" type="datetimeFigureOut">
               <a:rPr lang="en-US" smtClean="0"/>
-              <a:t>4/29/2023</a:t>
+              <a:t>5/2/2023</a:t>
             </a:fld>
             <a:endParaRPr lang="en-US"/>
           </a:p>
@@ -2908,7 +2942,7 @@
           <a:p>
             <a:fld id="{6B0EF491-B434-477E-862B-117F5FDA35FB}" type="datetimeFigureOut">
               <a:rPr lang="en-US" smtClean="0"/>
-              <a:t>4/29/2023</a:t>
+              <a:t>5/2/2023</a:t>
             </a:fld>
             <a:endParaRPr lang="en-US"/>
           </a:p>
@@ -5809,11 +5843,19 @@
             </a:br>
             <a:r>
               <a:rPr lang="en-US" sz="2400" dirty="0"/>
-              <a:t>	The dataset was decreased from 2111 rows to 1941 and the best algorithm with </a:t>
+              <a:t>	The dataset was decreased from 2111 rows to 1941 and the best algorithm with an accuracy of 94% is the </a:t>
+            </a:r>
+            <a:r>
+              <a:rPr lang="en-US" sz="2400" dirty="0" err="1"/>
+              <a:t>DecisionTreeClassifier</a:t>
+            </a:r>
+            <a:r>
+              <a:rPr lang="en-US" sz="2400" dirty="0"/>
+              <a:t> and 82% on the </a:t>
             </a:r>
             <a:r>
               <a:rPr lang="en-US" sz="2400"/>
-              <a:t>an accuracy of 93.7% is the … .</a:t>
+              <a:t>KNeighborsClassifier.</a:t>
             </a:r>
             <a:endParaRPr lang="en-US" sz="2400" dirty="0"/>
           </a:p>

</xml_diff>